<commit_message>
KNX Klemmen Polarität vertauscht
</commit_message>
<xml_diff>
--- a/applications/out8_16A_1.0/Beschriftung_Schaltaktor_out8_V2.1.pptx
+++ b/applications/out8_16A_1.0/Beschriftung_Schaltaktor_out8_V2.1.pptx
@@ -192,7 +192,7 @@
           <a:p>
             <a:fld id="{244B1028-47B8-4A78-9016-37111E4B8EB0}" type="datetimeFigureOut">
               <a:rPr lang="de-DE" smtClean="0"/>
-              <a:t>08.02.2020</a:t>
+              <a:t>31.10.2020</a:t>
             </a:fld>
             <a:endParaRPr lang="de-DE"/>
           </a:p>
@@ -6328,21 +6328,8 @@
                   <a:srgbClr val="000000"/>
                 </a:solidFill>
               </a:rPr>
-              <a:t>Jung </a:t>
-            </a:r>
-            <a:r>
-              <a:rPr lang="de-DE" sz="500" dirty="0">
-                <a:solidFill>
-                  <a:srgbClr val="000000"/>
-                </a:solidFill>
-              </a:rPr>
-              <a:t>2138</a:t>
-            </a:r>
-            <a:endParaRPr lang="de-DE" sz="500" dirty="0">
-              <a:solidFill>
-                <a:srgbClr val="000000"/>
-              </a:solidFill>
-            </a:endParaRPr>
+              <a:t>Jung 2138</a:t>
+            </a:r>
           </a:p>
           <a:p>
             <a:r>
@@ -8455,7 +8442,7 @@
         </p:nvSpPr>
         <p:spPr>
           <a:xfrm>
-            <a:off x="1993072" y="77025"/>
+            <a:off x="2085054" y="75400"/>
             <a:ext cx="70953" cy="100053"/>
           </a:xfrm>
           <a:prstGeom prst="rect">
@@ -8493,7 +8480,7 @@
         </p:nvSpPr>
         <p:spPr>
           <a:xfrm>
-            <a:off x="2077946" y="84170"/>
+            <a:off x="1986277" y="88587"/>
             <a:ext cx="70953" cy="100053"/>
           </a:xfrm>
           <a:prstGeom prst="rect">

</xml_diff>